<commit_message>
updated presentation slides (spelling, MVC, and minor font edits)
</commit_message>
<xml_diff>
--- a/DataViz_TeamBlue_Project2_v1.0.pptx
+++ b/DataViz_TeamBlue_Project2_v1.0.pptx
@@ -21,6 +21,7 @@
     <p:sldId id="266" r:id="rId18"/>
     <p:sldId id="267" r:id="rId19"/>
     <p:sldId id="268" r:id="rId20"/>
+    <p:sldId id="269" r:id="rId21"/>
   </p:sldIdLst>
   <p:sldSz cx="13004800" cy="9753600"/>
   <p:notesSz cx="6858000" cy="9144000"/>
@@ -3137,7 +3138,7 @@
       </p:sp>
       <p:sp>
         <p:nvSpPr>
-          <p:cNvPr id="121" name="Kevin Heaney, Rodney Mosquito, Abiel Ogbe, John Sachs…"/>
+          <p:cNvPr id="121" name="KevinHEANEY, RodneyMOSQUITO, AbielOGBE, JohnSACHS…"/>
           <p:cNvSpPr txBox="1"/>
           <p:nvPr>
             <p:ph type="body" sz="quarter" idx="1"/>
@@ -3152,19 +3153,76 @@
           <a:bodyPr/>
           <a:lstStyle/>
           <a:p>
-            <a:pPr defTabSz="543305">
-              <a:defRPr sz="3534"/>
+            <a:pPr defTabSz="519937">
+              <a:defRPr sz="3382"/>
             </a:pPr>
             <a:r>
-              <a:t>Kevin Heaney, Rodney Mosquito, Abiel Ogbe, John Sachs</a:t>
-            </a:r>
-          </a:p>
-          <a:p>
-            <a:pPr defTabSz="543305">
-              <a:defRPr sz="3534"/>
+              <a:t>Kevin</a:t>
+            </a:r>
+            <a:r>
+              <a:rPr>
+                <a:solidFill>
+                  <a:srgbClr val="000000"/>
+                </a:solidFill>
+              </a:rPr>
+              <a:t>HEANEY,</a:t>
+            </a:r>
+            <a:r>
+              <a:t> Rodney</a:t>
+            </a:r>
+            <a:r>
+              <a:rPr>
+                <a:solidFill>
+                  <a:srgbClr val="000000"/>
+                </a:solidFill>
+              </a:rPr>
+              <a:t>MOSQUITO</a:t>
+            </a:r>
+            <a:r>
+              <a:t>, Abiel</a:t>
+            </a:r>
+            <a:r>
+              <a:rPr>
+                <a:solidFill>
+                  <a:srgbClr val="000000"/>
+                </a:solidFill>
+              </a:rPr>
+              <a:t>OGBE</a:t>
+            </a:r>
+            <a:r>
+              <a:t>, John</a:t>
+            </a:r>
+            <a:r>
+              <a:rPr>
+                <a:solidFill>
+                  <a:srgbClr val="000000"/>
+                </a:solidFill>
+              </a:rPr>
+              <a:t>SACHS</a:t>
+            </a:r>
+          </a:p>
+          <a:p>
+            <a:pPr defTabSz="519937">
+              <a:defRPr sz="3382"/>
             </a:pPr>
             <a:r>
-              <a:t>Team Blue</a:t>
+              <a:rPr>
+                <a:solidFill>
+                  <a:srgbClr val="011993"/>
+                </a:solidFill>
+              </a:rPr>
+              <a:t>Team</a:t>
+            </a:r>
+            <a:r>
+              <a:t> </a:t>
+            </a:r>
+            <a:r>
+              <a:rPr>
+                <a:solidFill>
+                  <a:srgbClr val="011993"/>
+                </a:solidFill>
+              </a:rPr>
+              <a:t>Blue</a:t>
             </a:r>
           </a:p>
         </p:txBody>
@@ -3187,8 +3245,8 @@
         </p:blipFill>
         <p:spPr>
           <a:xfrm>
-            <a:off x="10769563" y="6908800"/>
-            <a:ext cx="844840" cy="1282701"/>
+            <a:off x="10769562" y="6908800"/>
+            <a:ext cx="844841" cy="1282700"/>
           </a:xfrm>
           <a:prstGeom prst="rect">
             <a:avLst/>
@@ -3226,7 +3284,7 @@
       </p:grpSpPr>
       <p:sp>
         <p:nvSpPr>
-          <p:cNvPr id="177" name="The choice"/>
+          <p:cNvPr id="175" name="Agenda"/>
           <p:cNvSpPr txBox="1"/>
           <p:nvPr>
             <p:ph type="title"/>
@@ -3243,21 +3301,122 @@
           <a:p>
             <a:pPr/>
             <a:r>
-              <a:t>The choice</a:t>
-            </a:r>
-          </a:p>
-        </p:txBody>
-      </p:sp>
-      <p:sp>
-        <p:nvSpPr>
-          <p:cNvPr id="178" name="DEMO!"/>
+              <a:t>Agenda</a:t>
+            </a:r>
+          </a:p>
+        </p:txBody>
+      </p:sp>
+      <p:sp>
+        <p:nvSpPr>
+          <p:cNvPr id="176" name="The Research Question…"/>
+          <p:cNvSpPr txBox="1"/>
+          <p:nvPr>
+            <p:ph type="body" sz="half" idx="1"/>
+          </p:nvPr>
+        </p:nvSpPr>
+        <p:spPr>
+          <a:prstGeom prst="rect">
+            <a:avLst/>
+          </a:prstGeom>
+        </p:spPr>
+        <p:txBody>
+          <a:bodyPr/>
+          <a:lstStyle/>
+          <a:p>
+            <a:pPr>
+              <a:defRPr>
+                <a:solidFill>
+                  <a:srgbClr val="D6D6D6"/>
+                </a:solidFill>
+              </a:defRPr>
+            </a:pPr>
+            <a:r>
+              <a:t>The Research Question</a:t>
+            </a:r>
+          </a:p>
+          <a:p>
+            <a:pPr>
+              <a:defRPr>
+                <a:solidFill>
+                  <a:srgbClr val="D6D6D6"/>
+                </a:solidFill>
+              </a:defRPr>
+            </a:pPr>
+            <a:r>
+              <a:t>The Challenge</a:t>
+            </a:r>
+          </a:p>
+          <a:p>
+            <a:pPr/>
+            <a:r>
+              <a:t>The Choice (Demo)</a:t>
+            </a:r>
+          </a:p>
+          <a:p>
+            <a:pPr>
+              <a:defRPr>
+                <a:solidFill>
+                  <a:srgbClr val="D6D6D6"/>
+                </a:solidFill>
+              </a:defRPr>
+            </a:pPr>
+            <a:r>
+              <a:t>The Impacts</a:t>
+            </a:r>
+          </a:p>
+          <a:p>
+            <a:pPr>
+              <a:defRPr>
+                <a:solidFill>
+                  <a:srgbClr val="D6D6D6"/>
+                </a:solidFill>
+              </a:defRPr>
+            </a:pPr>
+            <a:r>
+              <a:t>The End (Questions)</a:t>
+            </a:r>
+          </a:p>
+        </p:txBody>
+      </p:sp>
+      <p:pic>
+        <p:nvPicPr>
+          <p:cNvPr id="177" name="nycmap_black-c4ab43e9a3e2b0cf64475dc242f877e37f8e769f.png" descr="nycmap_black-c4ab43e9a3e2b0cf64475dc242f877e37f8e769f.png"/>
+          <p:cNvPicPr>
+            <a:picLocks noChangeAspect="1"/>
+          </p:cNvPicPr>
+          <p:nvPr/>
+        </p:nvPicPr>
+        <p:blipFill>
+          <a:blip r:embed="rId2">
+            <a:extLst/>
+          </a:blip>
+          <a:stretch>
+            <a:fillRect/>
+          </a:stretch>
+        </p:blipFill>
+        <p:spPr>
+          <a:xfrm>
+            <a:off x="6766619" y="3134419"/>
+            <a:ext cx="5491362" cy="5491362"/>
+          </a:xfrm>
+          <a:prstGeom prst="rect">
+            <a:avLst/>
+          </a:prstGeom>
+          <a:ln w="12700">
+            <a:miter lim="400000"/>
+          </a:ln>
+        </p:spPr>
+      </p:pic>
+      <p:sp>
+        <p:nvSpPr>
+          <p:cNvPr id="178" name="QUEENS"/>
           <p:cNvSpPr txBox="1"/>
           <p:nvPr/>
         </p:nvSpPr>
         <p:spPr>
-          <a:xfrm>
-            <a:off x="5756882" y="4565649"/>
-            <a:ext cx="1491036" cy="622301"/>
+          <a:xfrm rot="21551426">
+            <a:off x="10511581" y="5461000"/>
+            <a:ext cx="871638" cy="330201"/>
           </a:xfrm>
           <a:prstGeom prst="rect">
             <a:avLst/>
@@ -3275,11 +3434,215 @@
           <a:bodyPr wrap="none" lIns="50800" tIns="50800" rIns="50800" bIns="50800" anchor="ctr">
             <a:spAutoFit/>
           </a:bodyPr>
+          <a:lstStyle>
+            <a:lvl1pPr>
+              <a:defRPr sz="1600">
+                <a:solidFill>
+                  <a:srgbClr val="FFFFFF"/>
+                </a:solidFill>
+              </a:defRPr>
+            </a:lvl1pPr>
+          </a:lstStyle>
+          <a:p>
+            <a:pPr/>
+            <a:r>
+              <a:t>QUEENS</a:t>
+            </a:r>
+          </a:p>
+        </p:txBody>
+      </p:sp>
+      <p:sp>
+        <p:nvSpPr>
+          <p:cNvPr id="179" name="BROOKLYN"/>
+          <p:cNvSpPr txBox="1"/>
+          <p:nvPr/>
+        </p:nvSpPr>
+        <p:spPr>
+          <a:xfrm>
+            <a:off x="9062541" y="6667500"/>
+            <a:ext cx="1128118" cy="330201"/>
+          </a:xfrm>
+          <a:prstGeom prst="rect">
+            <a:avLst/>
+          </a:prstGeom>
+          <a:ln w="12700">
+            <a:miter lim="400000"/>
+          </a:ln>
+          <a:extLst>
+            <a:ext uri="{C572A759-6A51-4108-AA02-DFA0A04FC94B}">
+              <ma14:wrappingTextBoxFlag xmlns:ma14="http://schemas.microsoft.com/office/mac/drawingml/2011/main" val="1"/>
+            </a:ext>
+          </a:extLst>
+        </p:spPr>
+        <p:txBody>
+          <a:bodyPr wrap="none" lIns="50800" tIns="50800" rIns="50800" bIns="50800" anchor="ctr">
+            <a:spAutoFit/>
+          </a:bodyPr>
+          <a:lstStyle>
+            <a:lvl1pPr>
+              <a:defRPr sz="1600">
+                <a:solidFill>
+                  <a:srgbClr val="FFFFFF"/>
+                </a:solidFill>
+              </a:defRPr>
+            </a:lvl1pPr>
+          </a:lstStyle>
+          <a:p>
+            <a:pPr/>
+            <a:r>
+              <a:t>BROOKLYN</a:t>
+            </a:r>
+          </a:p>
+        </p:txBody>
+      </p:sp>
+      <p:sp>
+        <p:nvSpPr>
+          <p:cNvPr id="180" name="STATEN…"/>
+          <p:cNvSpPr txBox="1"/>
+          <p:nvPr/>
+        </p:nvSpPr>
+        <p:spPr>
+          <a:xfrm>
+            <a:off x="7652097" y="6883400"/>
+            <a:ext cx="850206" cy="558801"/>
+          </a:xfrm>
+          <a:prstGeom prst="rect">
+            <a:avLst/>
+          </a:prstGeom>
+          <a:ln w="12700">
+            <a:miter lim="400000"/>
+          </a:ln>
+          <a:extLst>
+            <a:ext uri="{C572A759-6A51-4108-AA02-DFA0A04FC94B}">
+              <ma14:wrappingTextBoxFlag xmlns:ma14="http://schemas.microsoft.com/office/mac/drawingml/2011/main" val="1"/>
+            </a:ext>
+          </a:extLst>
+        </p:spPr>
+        <p:txBody>
+          <a:bodyPr wrap="none" lIns="50800" tIns="50800" rIns="50800" bIns="50800" anchor="ctr">
+            <a:spAutoFit/>
+          </a:bodyPr>
           <a:lstStyle/>
           <a:p>
+            <a:pPr>
+              <a:defRPr sz="1600">
+                <a:solidFill>
+                  <a:srgbClr val="FFFFFF"/>
+                </a:solidFill>
+              </a:defRPr>
+            </a:pPr>
+            <a:r>
+              <a:t>STATEN</a:t>
+            </a:r>
+          </a:p>
+          <a:p>
+            <a:pPr>
+              <a:defRPr sz="1600">
+                <a:solidFill>
+                  <a:srgbClr val="FFFFFF"/>
+                </a:solidFill>
+              </a:defRPr>
+            </a:pPr>
+            <a:r>
+              <a:t>ISLAND</a:t>
+            </a:r>
+          </a:p>
+        </p:txBody>
+      </p:sp>
+      <p:sp>
+        <p:nvSpPr>
+          <p:cNvPr id="181" name="THE…"/>
+          <p:cNvSpPr txBox="1"/>
+          <p:nvPr/>
+        </p:nvSpPr>
+        <p:spPr>
+          <a:xfrm>
+            <a:off x="10090546" y="3777687"/>
+            <a:ext cx="799308" cy="558801"/>
+          </a:xfrm>
+          <a:prstGeom prst="rect">
+            <a:avLst/>
+          </a:prstGeom>
+          <a:ln w="12700">
+            <a:miter lim="400000"/>
+          </a:ln>
+          <a:extLst>
+            <a:ext uri="{C572A759-6A51-4108-AA02-DFA0A04FC94B}">
+              <ma14:wrappingTextBoxFlag xmlns:ma14="http://schemas.microsoft.com/office/mac/drawingml/2011/main" val="1"/>
+            </a:ext>
+          </a:extLst>
+        </p:spPr>
+        <p:txBody>
+          <a:bodyPr wrap="none" lIns="50800" tIns="50800" rIns="50800" bIns="50800" anchor="ctr">
+            <a:spAutoFit/>
+          </a:bodyPr>
+          <a:lstStyle/>
+          <a:p>
+            <a:pPr>
+              <a:defRPr sz="1600">
+                <a:solidFill>
+                  <a:srgbClr val="FFFFFF"/>
+                </a:solidFill>
+              </a:defRPr>
+            </a:pPr>
+            <a:r>
+              <a:t>THE</a:t>
+            </a:r>
+          </a:p>
+          <a:p>
+            <a:pPr>
+              <a:defRPr sz="1600">
+                <a:solidFill>
+                  <a:srgbClr val="FFFFFF"/>
+                </a:solidFill>
+              </a:defRPr>
+            </a:pPr>
+            <a:r>
+              <a:t>BRONX</a:t>
+            </a:r>
+          </a:p>
+        </p:txBody>
+      </p:sp>
+      <p:sp>
+        <p:nvSpPr>
+          <p:cNvPr id="182" name="MANHATTAN"/>
+          <p:cNvSpPr txBox="1"/>
+          <p:nvPr/>
+        </p:nvSpPr>
+        <p:spPr>
+          <a:xfrm rot="17688572">
+            <a:off x="8960736" y="4972050"/>
+            <a:ext cx="1103128" cy="292101"/>
+          </a:xfrm>
+          <a:prstGeom prst="rect">
+            <a:avLst/>
+          </a:prstGeom>
+          <a:ln w="12700">
+            <a:miter lim="400000"/>
+          </a:ln>
+          <a:extLst>
+            <a:ext uri="{C572A759-6A51-4108-AA02-DFA0A04FC94B}">
+              <ma14:wrappingTextBoxFlag xmlns:ma14="http://schemas.microsoft.com/office/mac/drawingml/2011/main" val="1"/>
+            </a:ext>
+          </a:extLst>
+        </p:spPr>
+        <p:txBody>
+          <a:bodyPr wrap="none" lIns="50800" tIns="50800" rIns="50800" bIns="50800" anchor="ctr">
+            <a:spAutoFit/>
+          </a:bodyPr>
+          <a:lstStyle>
+            <a:lvl1pPr>
+              <a:defRPr sz="1300">
+                <a:solidFill>
+                  <a:srgbClr val="FFFFFF"/>
+                </a:solidFill>
+              </a:defRPr>
+            </a:lvl1pPr>
+          </a:lstStyle>
+          <a:p>
             <a:pPr/>
             <a:r>
-              <a:t>DEMO!</a:t>
+              <a:t>MANHATTAN</a:t>
             </a:r>
           </a:p>
         </p:txBody>
@@ -3312,7 +3675,7 @@
       </p:grpSpPr>
       <p:sp>
         <p:nvSpPr>
-          <p:cNvPr id="180" name="Agenda"/>
+          <p:cNvPr id="184" name="The choice"/>
           <p:cNvSpPr txBox="1"/>
           <p:nvPr>
             <p:ph type="title"/>
@@ -3329,122 +3692,21 @@
           <a:p>
             <a:pPr/>
             <a:r>
-              <a:t>Agenda</a:t>
-            </a:r>
-          </a:p>
-        </p:txBody>
-      </p:sp>
-      <p:sp>
-        <p:nvSpPr>
-          <p:cNvPr id="181" name="The Research Question…"/>
-          <p:cNvSpPr txBox="1"/>
-          <p:nvPr>
-            <p:ph type="body" sz="half" idx="1"/>
-          </p:nvPr>
-        </p:nvSpPr>
-        <p:spPr>
-          <a:prstGeom prst="rect">
-            <a:avLst/>
-          </a:prstGeom>
-        </p:spPr>
-        <p:txBody>
-          <a:bodyPr/>
-          <a:lstStyle/>
-          <a:p>
-            <a:pPr>
-              <a:defRPr>
-                <a:solidFill>
-                  <a:srgbClr val="D6D6D6"/>
-                </a:solidFill>
-              </a:defRPr>
-            </a:pPr>
-            <a:r>
-              <a:t>The Research Question</a:t>
-            </a:r>
-          </a:p>
-          <a:p>
-            <a:pPr>
-              <a:defRPr>
-                <a:solidFill>
-                  <a:srgbClr val="D6D6D6"/>
-                </a:solidFill>
-              </a:defRPr>
-            </a:pPr>
-            <a:r>
-              <a:t>The Challenge</a:t>
-            </a:r>
-          </a:p>
-          <a:p>
-            <a:pPr>
-              <a:defRPr>
-                <a:solidFill>
-                  <a:srgbClr val="D6D6D6"/>
-                </a:solidFill>
-              </a:defRPr>
-            </a:pPr>
-            <a:r>
-              <a:t>The Choice (Demo)</a:t>
-            </a:r>
-          </a:p>
-          <a:p>
-            <a:pPr/>
-            <a:r>
-              <a:t>The Impacts</a:t>
-            </a:r>
-          </a:p>
-          <a:p>
-            <a:pPr>
-              <a:defRPr>
-                <a:solidFill>
-                  <a:srgbClr val="D6D6D6"/>
-                </a:solidFill>
-              </a:defRPr>
-            </a:pPr>
-            <a:r>
-              <a:t>The End (Questions)</a:t>
-            </a:r>
-          </a:p>
-        </p:txBody>
-      </p:sp>
-      <p:pic>
-        <p:nvPicPr>
-          <p:cNvPr id="182" name="nycmap_black-c4ab43e9a3e2b0cf64475dc242f877e37f8e769f.png" descr="nycmap_black-c4ab43e9a3e2b0cf64475dc242f877e37f8e769f.png"/>
-          <p:cNvPicPr>
-            <a:picLocks noChangeAspect="1"/>
-          </p:cNvPicPr>
-          <p:nvPr/>
-        </p:nvPicPr>
-        <p:blipFill>
-          <a:blip r:embed="rId2">
-            <a:extLst/>
-          </a:blip>
-          <a:stretch>
-            <a:fillRect/>
-          </a:stretch>
-        </p:blipFill>
-        <p:spPr>
-          <a:xfrm>
-            <a:off x="6766619" y="3134419"/>
-            <a:ext cx="5491362" cy="5491362"/>
-          </a:xfrm>
-          <a:prstGeom prst="rect">
-            <a:avLst/>
-          </a:prstGeom>
-          <a:ln w="12700">
-            <a:miter lim="400000"/>
-          </a:ln>
-        </p:spPr>
-      </p:pic>
-      <p:sp>
-        <p:nvSpPr>
-          <p:cNvPr id="183" name="QUEENS"/>
+              <a:t>The choice</a:t>
+            </a:r>
+          </a:p>
+        </p:txBody>
+      </p:sp>
+      <p:sp>
+        <p:nvSpPr>
+          <p:cNvPr id="185" name="DEMO!"/>
           <p:cNvSpPr txBox="1"/>
           <p:nvPr/>
         </p:nvSpPr>
         <p:spPr>
-          <a:xfrm rot="21551426">
-            <a:off x="10511581" y="5461000"/>
-            <a:ext cx="871638" cy="330201"/>
+          <a:xfrm>
+            <a:off x="5756882" y="4565649"/>
+            <a:ext cx="1491036" cy="622301"/>
           </a:xfrm>
           <a:prstGeom prst="rect">
             <a:avLst/>
@@ -3462,215 +3724,11 @@
           <a:bodyPr wrap="none" lIns="50800" tIns="50800" rIns="50800" bIns="50800" anchor="ctr">
             <a:spAutoFit/>
           </a:bodyPr>
-          <a:lstStyle>
-            <a:lvl1pPr>
-              <a:defRPr sz="1600">
-                <a:solidFill>
-                  <a:srgbClr val="FFFFFF"/>
-                </a:solidFill>
-              </a:defRPr>
-            </a:lvl1pPr>
-          </a:lstStyle>
+          <a:lstStyle/>
           <a:p>
             <a:pPr/>
             <a:r>
-              <a:t>QUEENS</a:t>
-            </a:r>
-          </a:p>
-        </p:txBody>
-      </p:sp>
-      <p:sp>
-        <p:nvSpPr>
-          <p:cNvPr id="184" name="BROOKLYN"/>
-          <p:cNvSpPr txBox="1"/>
-          <p:nvPr/>
-        </p:nvSpPr>
-        <p:spPr>
-          <a:xfrm>
-            <a:off x="9062541" y="6667500"/>
-            <a:ext cx="1128118" cy="330201"/>
-          </a:xfrm>
-          <a:prstGeom prst="rect">
-            <a:avLst/>
-          </a:prstGeom>
-          <a:ln w="12700">
-            <a:miter lim="400000"/>
-          </a:ln>
-          <a:extLst>
-            <a:ext uri="{C572A759-6A51-4108-AA02-DFA0A04FC94B}">
-              <ma14:wrappingTextBoxFlag xmlns:ma14="http://schemas.microsoft.com/office/mac/drawingml/2011/main" val="1"/>
-            </a:ext>
-          </a:extLst>
-        </p:spPr>
-        <p:txBody>
-          <a:bodyPr wrap="none" lIns="50800" tIns="50800" rIns="50800" bIns="50800" anchor="ctr">
-            <a:spAutoFit/>
-          </a:bodyPr>
-          <a:lstStyle>
-            <a:lvl1pPr>
-              <a:defRPr sz="1600">
-                <a:solidFill>
-                  <a:srgbClr val="FFFFFF"/>
-                </a:solidFill>
-              </a:defRPr>
-            </a:lvl1pPr>
-          </a:lstStyle>
-          <a:p>
-            <a:pPr/>
-            <a:r>
-              <a:t>BROOKLYN</a:t>
-            </a:r>
-          </a:p>
-        </p:txBody>
-      </p:sp>
-      <p:sp>
-        <p:nvSpPr>
-          <p:cNvPr id="185" name="STATEN…"/>
-          <p:cNvSpPr txBox="1"/>
-          <p:nvPr/>
-        </p:nvSpPr>
-        <p:spPr>
-          <a:xfrm>
-            <a:off x="7652097" y="6883400"/>
-            <a:ext cx="850206" cy="558801"/>
-          </a:xfrm>
-          <a:prstGeom prst="rect">
-            <a:avLst/>
-          </a:prstGeom>
-          <a:ln w="12700">
-            <a:miter lim="400000"/>
-          </a:ln>
-          <a:extLst>
-            <a:ext uri="{C572A759-6A51-4108-AA02-DFA0A04FC94B}">
-              <ma14:wrappingTextBoxFlag xmlns:ma14="http://schemas.microsoft.com/office/mac/drawingml/2011/main" val="1"/>
-            </a:ext>
-          </a:extLst>
-        </p:spPr>
-        <p:txBody>
-          <a:bodyPr wrap="none" lIns="50800" tIns="50800" rIns="50800" bIns="50800" anchor="ctr">
-            <a:spAutoFit/>
-          </a:bodyPr>
-          <a:lstStyle/>
-          <a:p>
-            <a:pPr>
-              <a:defRPr sz="1600">
-                <a:solidFill>
-                  <a:srgbClr val="FFFFFF"/>
-                </a:solidFill>
-              </a:defRPr>
-            </a:pPr>
-            <a:r>
-              <a:t>STATEN</a:t>
-            </a:r>
-          </a:p>
-          <a:p>
-            <a:pPr>
-              <a:defRPr sz="1600">
-                <a:solidFill>
-                  <a:srgbClr val="FFFFFF"/>
-                </a:solidFill>
-              </a:defRPr>
-            </a:pPr>
-            <a:r>
-              <a:t>ISLAND</a:t>
-            </a:r>
-          </a:p>
-        </p:txBody>
-      </p:sp>
-      <p:sp>
-        <p:nvSpPr>
-          <p:cNvPr id="186" name="THE…"/>
-          <p:cNvSpPr txBox="1"/>
-          <p:nvPr/>
-        </p:nvSpPr>
-        <p:spPr>
-          <a:xfrm>
-            <a:off x="10090546" y="3777687"/>
-            <a:ext cx="799308" cy="558801"/>
-          </a:xfrm>
-          <a:prstGeom prst="rect">
-            <a:avLst/>
-          </a:prstGeom>
-          <a:ln w="12700">
-            <a:miter lim="400000"/>
-          </a:ln>
-          <a:extLst>
-            <a:ext uri="{C572A759-6A51-4108-AA02-DFA0A04FC94B}">
-              <ma14:wrappingTextBoxFlag xmlns:ma14="http://schemas.microsoft.com/office/mac/drawingml/2011/main" val="1"/>
-            </a:ext>
-          </a:extLst>
-        </p:spPr>
-        <p:txBody>
-          <a:bodyPr wrap="none" lIns="50800" tIns="50800" rIns="50800" bIns="50800" anchor="ctr">
-            <a:spAutoFit/>
-          </a:bodyPr>
-          <a:lstStyle/>
-          <a:p>
-            <a:pPr>
-              <a:defRPr sz="1600">
-                <a:solidFill>
-                  <a:srgbClr val="FFFFFF"/>
-                </a:solidFill>
-              </a:defRPr>
-            </a:pPr>
-            <a:r>
-              <a:t>THE</a:t>
-            </a:r>
-          </a:p>
-          <a:p>
-            <a:pPr>
-              <a:defRPr sz="1600">
-                <a:solidFill>
-                  <a:srgbClr val="FFFFFF"/>
-                </a:solidFill>
-              </a:defRPr>
-            </a:pPr>
-            <a:r>
-              <a:t>BRONX</a:t>
-            </a:r>
-          </a:p>
-        </p:txBody>
-      </p:sp>
-      <p:sp>
-        <p:nvSpPr>
-          <p:cNvPr id="187" name="MANHATTAN"/>
-          <p:cNvSpPr txBox="1"/>
-          <p:nvPr/>
-        </p:nvSpPr>
-        <p:spPr>
-          <a:xfrm rot="17688572">
-            <a:off x="8960736" y="4972050"/>
-            <a:ext cx="1103128" cy="292101"/>
-          </a:xfrm>
-          <a:prstGeom prst="rect">
-            <a:avLst/>
-          </a:prstGeom>
-          <a:ln w="12700">
-            <a:miter lim="400000"/>
-          </a:ln>
-          <a:extLst>
-            <a:ext uri="{C572A759-6A51-4108-AA02-DFA0A04FC94B}">
-              <ma14:wrappingTextBoxFlag xmlns:ma14="http://schemas.microsoft.com/office/mac/drawingml/2011/main" val="1"/>
-            </a:ext>
-          </a:extLst>
-        </p:spPr>
-        <p:txBody>
-          <a:bodyPr wrap="none" lIns="50800" tIns="50800" rIns="50800" bIns="50800" anchor="ctr">
-            <a:spAutoFit/>
-          </a:bodyPr>
-          <a:lstStyle>
-            <a:lvl1pPr>
-              <a:defRPr sz="1300">
-                <a:solidFill>
-                  <a:srgbClr val="FFFFFF"/>
-                </a:solidFill>
-              </a:defRPr>
-            </a:lvl1pPr>
-          </a:lstStyle>
-          <a:p>
-            <a:pPr/>
-            <a:r>
-              <a:t>MANHATTAN</a:t>
+              <a:t>DEMO!</a:t>
             </a:r>
           </a:p>
         </p:txBody>
@@ -3703,7 +3761,7 @@
       </p:grpSpPr>
       <p:sp>
         <p:nvSpPr>
-          <p:cNvPr id="189" name="The impacts"/>
+          <p:cNvPr id="187" name="Agenda"/>
           <p:cNvSpPr txBox="1"/>
           <p:nvPr>
             <p:ph type="title"/>
@@ -3720,17 +3778,17 @@
           <a:p>
             <a:pPr/>
             <a:r>
-              <a:t>The impacts</a:t>
-            </a:r>
-          </a:p>
-        </p:txBody>
-      </p:sp>
-      <p:sp>
-        <p:nvSpPr>
-          <p:cNvPr id="190" name="Strategic Value: Geoloctes government jobs (Where are the jobs? How many are there?)…"/>
+              <a:t>Agenda</a:t>
+            </a:r>
+          </a:p>
+        </p:txBody>
+      </p:sp>
+      <p:sp>
+        <p:nvSpPr>
+          <p:cNvPr id="188" name="The Research Question…"/>
           <p:cNvSpPr txBox="1"/>
           <p:nvPr>
-            <p:ph type="body" idx="1"/>
+            <p:ph type="body" sz="half" idx="1"/>
           </p:nvPr>
         </p:nvSpPr>
         <p:spPr>
@@ -3742,21 +3800,326 @@
           <a:bodyPr/>
           <a:lstStyle/>
           <a:p>
+            <a:pPr>
+              <a:defRPr>
+                <a:solidFill>
+                  <a:srgbClr val="D6D6D6"/>
+                </a:solidFill>
+              </a:defRPr>
+            </a:pPr>
+            <a:r>
+              <a:t>The Research Question</a:t>
+            </a:r>
+          </a:p>
+          <a:p>
+            <a:pPr>
+              <a:defRPr>
+                <a:solidFill>
+                  <a:srgbClr val="D6D6D6"/>
+                </a:solidFill>
+              </a:defRPr>
+            </a:pPr>
+            <a:r>
+              <a:t>The Challenge</a:t>
+            </a:r>
+          </a:p>
+          <a:p>
+            <a:pPr>
+              <a:defRPr>
+                <a:solidFill>
+                  <a:srgbClr val="D6D6D6"/>
+                </a:solidFill>
+              </a:defRPr>
+            </a:pPr>
+            <a:r>
+              <a:t>The Choice (Demo)</a:t>
+            </a:r>
+          </a:p>
+          <a:p>
             <a:pPr/>
             <a:r>
-              <a:t>Strategic Value: Geoloctes government jobs (Where are the jobs? How many are there?)</a:t>
-            </a:r>
-          </a:p>
+              <a:t>The Impacts</a:t>
+            </a:r>
+          </a:p>
+          <a:p>
+            <a:pPr>
+              <a:defRPr>
+                <a:solidFill>
+                  <a:srgbClr val="D6D6D6"/>
+                </a:solidFill>
+              </a:defRPr>
+            </a:pPr>
+            <a:r>
+              <a:t>The End (Questions)</a:t>
+            </a:r>
+          </a:p>
+        </p:txBody>
+      </p:sp>
+      <p:pic>
+        <p:nvPicPr>
+          <p:cNvPr id="189" name="nycmap_black-c4ab43e9a3e2b0cf64475dc242f877e37f8e769f.png" descr="nycmap_black-c4ab43e9a3e2b0cf64475dc242f877e37f8e769f.png"/>
+          <p:cNvPicPr>
+            <a:picLocks noChangeAspect="1"/>
+          </p:cNvPicPr>
+          <p:nvPr/>
+        </p:nvPicPr>
+        <p:blipFill>
+          <a:blip r:embed="rId2">
+            <a:extLst/>
+          </a:blip>
+          <a:stretch>
+            <a:fillRect/>
+          </a:stretch>
+        </p:blipFill>
+        <p:spPr>
+          <a:xfrm>
+            <a:off x="6766619" y="3134419"/>
+            <a:ext cx="5491362" cy="5491362"/>
+          </a:xfrm>
+          <a:prstGeom prst="rect">
+            <a:avLst/>
+          </a:prstGeom>
+          <a:ln w="12700">
+            <a:miter lim="400000"/>
+          </a:ln>
+        </p:spPr>
+      </p:pic>
+      <p:sp>
+        <p:nvSpPr>
+          <p:cNvPr id="190" name="QUEENS"/>
+          <p:cNvSpPr txBox="1"/>
+          <p:nvPr/>
+        </p:nvSpPr>
+        <p:spPr>
+          <a:xfrm rot="21551426">
+            <a:off x="10511581" y="5461000"/>
+            <a:ext cx="871638" cy="330201"/>
+          </a:xfrm>
+          <a:prstGeom prst="rect">
+            <a:avLst/>
+          </a:prstGeom>
+          <a:ln w="12700">
+            <a:miter lim="400000"/>
+          </a:ln>
+          <a:extLst>
+            <a:ext uri="{C572A759-6A51-4108-AA02-DFA0A04FC94B}">
+              <ma14:wrappingTextBoxFlag xmlns:ma14="http://schemas.microsoft.com/office/mac/drawingml/2011/main" val="1"/>
+            </a:ext>
+          </a:extLst>
+        </p:spPr>
+        <p:txBody>
+          <a:bodyPr wrap="none" lIns="50800" tIns="50800" rIns="50800" bIns="50800" anchor="ctr">
+            <a:spAutoFit/>
+          </a:bodyPr>
+          <a:lstStyle>
+            <a:lvl1pPr>
+              <a:defRPr sz="1600">
+                <a:solidFill>
+                  <a:srgbClr val="FFFFFF"/>
+                </a:solidFill>
+              </a:defRPr>
+            </a:lvl1pPr>
+          </a:lstStyle>
           <a:p>
             <a:pPr/>
             <a:r>
-              <a:t>Financial Value: Identifies the salary ranges in each borough (Where is the money?)</a:t>
-            </a:r>
-          </a:p>
+              <a:t>QUEENS</a:t>
+            </a:r>
+          </a:p>
+        </p:txBody>
+      </p:sp>
+      <p:sp>
+        <p:nvSpPr>
+          <p:cNvPr id="191" name="BROOKLYN"/>
+          <p:cNvSpPr txBox="1"/>
+          <p:nvPr/>
+        </p:nvSpPr>
+        <p:spPr>
+          <a:xfrm>
+            <a:off x="9062541" y="6667500"/>
+            <a:ext cx="1128118" cy="330201"/>
+          </a:xfrm>
+          <a:prstGeom prst="rect">
+            <a:avLst/>
+          </a:prstGeom>
+          <a:ln w="12700">
+            <a:miter lim="400000"/>
+          </a:ln>
+          <a:extLst>
+            <a:ext uri="{C572A759-6A51-4108-AA02-DFA0A04FC94B}">
+              <ma14:wrappingTextBoxFlag xmlns:ma14="http://schemas.microsoft.com/office/mac/drawingml/2011/main" val="1"/>
+            </a:ext>
+          </a:extLst>
+        </p:spPr>
+        <p:txBody>
+          <a:bodyPr wrap="none" lIns="50800" tIns="50800" rIns="50800" bIns="50800" anchor="ctr">
+            <a:spAutoFit/>
+          </a:bodyPr>
+          <a:lstStyle>
+            <a:lvl1pPr>
+              <a:defRPr sz="1600">
+                <a:solidFill>
+                  <a:srgbClr val="FFFFFF"/>
+                </a:solidFill>
+              </a:defRPr>
+            </a:lvl1pPr>
+          </a:lstStyle>
           <a:p>
             <a:pPr/>
             <a:r>
-              <a:t>Personal Value: Saves the candidate time and makes job search easier</a:t>
+              <a:t>BROOKLYN</a:t>
+            </a:r>
+          </a:p>
+        </p:txBody>
+      </p:sp>
+      <p:sp>
+        <p:nvSpPr>
+          <p:cNvPr id="192" name="STATEN…"/>
+          <p:cNvSpPr txBox="1"/>
+          <p:nvPr/>
+        </p:nvSpPr>
+        <p:spPr>
+          <a:xfrm>
+            <a:off x="7652097" y="6883400"/>
+            <a:ext cx="850206" cy="558801"/>
+          </a:xfrm>
+          <a:prstGeom prst="rect">
+            <a:avLst/>
+          </a:prstGeom>
+          <a:ln w="12700">
+            <a:miter lim="400000"/>
+          </a:ln>
+          <a:extLst>
+            <a:ext uri="{C572A759-6A51-4108-AA02-DFA0A04FC94B}">
+              <ma14:wrappingTextBoxFlag xmlns:ma14="http://schemas.microsoft.com/office/mac/drawingml/2011/main" val="1"/>
+            </a:ext>
+          </a:extLst>
+        </p:spPr>
+        <p:txBody>
+          <a:bodyPr wrap="none" lIns="50800" tIns="50800" rIns="50800" bIns="50800" anchor="ctr">
+            <a:spAutoFit/>
+          </a:bodyPr>
+          <a:lstStyle/>
+          <a:p>
+            <a:pPr>
+              <a:defRPr sz="1600">
+                <a:solidFill>
+                  <a:srgbClr val="FFFFFF"/>
+                </a:solidFill>
+              </a:defRPr>
+            </a:pPr>
+            <a:r>
+              <a:t>STATEN</a:t>
+            </a:r>
+          </a:p>
+          <a:p>
+            <a:pPr>
+              <a:defRPr sz="1600">
+                <a:solidFill>
+                  <a:srgbClr val="FFFFFF"/>
+                </a:solidFill>
+              </a:defRPr>
+            </a:pPr>
+            <a:r>
+              <a:t>ISLAND</a:t>
+            </a:r>
+          </a:p>
+        </p:txBody>
+      </p:sp>
+      <p:sp>
+        <p:nvSpPr>
+          <p:cNvPr id="193" name="THE…"/>
+          <p:cNvSpPr txBox="1"/>
+          <p:nvPr/>
+        </p:nvSpPr>
+        <p:spPr>
+          <a:xfrm>
+            <a:off x="10090546" y="3777687"/>
+            <a:ext cx="799308" cy="558801"/>
+          </a:xfrm>
+          <a:prstGeom prst="rect">
+            <a:avLst/>
+          </a:prstGeom>
+          <a:ln w="12700">
+            <a:miter lim="400000"/>
+          </a:ln>
+          <a:extLst>
+            <a:ext uri="{C572A759-6A51-4108-AA02-DFA0A04FC94B}">
+              <ma14:wrappingTextBoxFlag xmlns:ma14="http://schemas.microsoft.com/office/mac/drawingml/2011/main" val="1"/>
+            </a:ext>
+          </a:extLst>
+        </p:spPr>
+        <p:txBody>
+          <a:bodyPr wrap="none" lIns="50800" tIns="50800" rIns="50800" bIns="50800" anchor="ctr">
+            <a:spAutoFit/>
+          </a:bodyPr>
+          <a:lstStyle/>
+          <a:p>
+            <a:pPr>
+              <a:defRPr sz="1600">
+                <a:solidFill>
+                  <a:srgbClr val="FFFFFF"/>
+                </a:solidFill>
+              </a:defRPr>
+            </a:pPr>
+            <a:r>
+              <a:t>THE</a:t>
+            </a:r>
+          </a:p>
+          <a:p>
+            <a:pPr>
+              <a:defRPr sz="1600">
+                <a:solidFill>
+                  <a:srgbClr val="FFFFFF"/>
+                </a:solidFill>
+              </a:defRPr>
+            </a:pPr>
+            <a:r>
+              <a:t>BRONX</a:t>
+            </a:r>
+          </a:p>
+        </p:txBody>
+      </p:sp>
+      <p:sp>
+        <p:nvSpPr>
+          <p:cNvPr id="194" name="MANHATTAN"/>
+          <p:cNvSpPr txBox="1"/>
+          <p:nvPr/>
+        </p:nvSpPr>
+        <p:spPr>
+          <a:xfrm rot="17688572">
+            <a:off x="8960736" y="4972050"/>
+            <a:ext cx="1103128" cy="292101"/>
+          </a:xfrm>
+          <a:prstGeom prst="rect">
+            <a:avLst/>
+          </a:prstGeom>
+          <a:ln w="12700">
+            <a:miter lim="400000"/>
+          </a:ln>
+          <a:extLst>
+            <a:ext uri="{C572A759-6A51-4108-AA02-DFA0A04FC94B}">
+              <ma14:wrappingTextBoxFlag xmlns:ma14="http://schemas.microsoft.com/office/mac/drawingml/2011/main" val="1"/>
+            </a:ext>
+          </a:extLst>
+        </p:spPr>
+        <p:txBody>
+          <a:bodyPr wrap="none" lIns="50800" tIns="50800" rIns="50800" bIns="50800" anchor="ctr">
+            <a:spAutoFit/>
+          </a:bodyPr>
+          <a:lstStyle>
+            <a:lvl1pPr>
+              <a:defRPr sz="1300">
+                <a:solidFill>
+                  <a:srgbClr val="FFFFFF"/>
+                </a:solidFill>
+              </a:defRPr>
+            </a:lvl1pPr>
+          </a:lstStyle>
+          <a:p>
+            <a:pPr/>
+            <a:r>
+              <a:t>MANHATTAN</a:t>
             </a:r>
           </a:p>
         </p:txBody>
@@ -3789,7 +4152,7 @@
       </p:grpSpPr>
       <p:sp>
         <p:nvSpPr>
-          <p:cNvPr id="192" name="Agenda"/>
+          <p:cNvPr id="196" name="The impacts"/>
           <p:cNvSpPr txBox="1"/>
           <p:nvPr>
             <p:ph type="title"/>
@@ -3806,6 +4169,92 @@
           <a:p>
             <a:pPr/>
             <a:r>
+              <a:t>The impacts</a:t>
+            </a:r>
+          </a:p>
+        </p:txBody>
+      </p:sp>
+      <p:sp>
+        <p:nvSpPr>
+          <p:cNvPr id="197" name="Strategic Value: Geolocates government jobs (Where are the jobs? How many are there?)…"/>
+          <p:cNvSpPr txBox="1"/>
+          <p:nvPr>
+            <p:ph type="body" idx="1"/>
+          </p:nvPr>
+        </p:nvSpPr>
+        <p:spPr>
+          <a:prstGeom prst="rect">
+            <a:avLst/>
+          </a:prstGeom>
+        </p:spPr>
+        <p:txBody>
+          <a:bodyPr/>
+          <a:lstStyle/>
+          <a:p>
+            <a:pPr/>
+            <a:r>
+              <a:t>Strategic Value: Geolocates government jobs (Where are the jobs? How many are there?)</a:t>
+            </a:r>
+          </a:p>
+          <a:p>
+            <a:pPr/>
+            <a:r>
+              <a:t>Financial Value: Identifies the salary ranges in each borough (Where is the money?)</a:t>
+            </a:r>
+          </a:p>
+          <a:p>
+            <a:pPr/>
+            <a:r>
+              <a:t>Personal Value: Saves the candidate time and makes job search easier</a:t>
+            </a:r>
+          </a:p>
+        </p:txBody>
+      </p:sp>
+    </p:spTree>
+  </p:cSld>
+  <p:clrMapOvr>
+    <a:masterClrMapping/>
+  </p:clrMapOvr>
+  <p:transition xmlns:p14="http://schemas.microsoft.com/office/powerpoint/2010/main" spd="med" advClick="1"/>
+</p:sld>
+</file>
+
+<file path=ppt/slides/slide14.xml><?xml version="1.0" encoding="utf-8"?>
+<p:sld xmlns:a="http://schemas.openxmlformats.org/drawingml/2006/main" xmlns:r="http://schemas.openxmlformats.org/officeDocument/2006/relationships" xmlns:p="http://schemas.openxmlformats.org/presentationml/2006/main" xmlns:m="http://schemas.openxmlformats.org/officeDocument/2006/math" xmlns:a14="http://schemas.microsoft.com/office/drawing/2010/main" showMasterSp="1" showMasterPhAnim="1">
+  <p:cSld>
+    <p:spTree>
+      <p:nvGrpSpPr>
+        <p:cNvPr id="1" name=""/>
+        <p:cNvGrpSpPr/>
+        <p:nvPr/>
+      </p:nvGrpSpPr>
+      <p:grpSpPr>
+        <a:xfrm>
+          <a:off x="0" y="0"/>
+          <a:ext cx="0" cy="0"/>
+          <a:chOff x="0" y="0"/>
+          <a:chExt cx="0" cy="0"/>
+        </a:xfrm>
+      </p:grpSpPr>
+      <p:sp>
+        <p:nvSpPr>
+          <p:cNvPr id="199" name="Agenda"/>
+          <p:cNvSpPr txBox="1"/>
+          <p:nvPr>
+            <p:ph type="title"/>
+          </p:nvPr>
+        </p:nvSpPr>
+        <p:spPr>
+          <a:prstGeom prst="rect">
+            <a:avLst/>
+          </a:prstGeom>
+        </p:spPr>
+        <p:txBody>
+          <a:bodyPr/>
+          <a:lstStyle/>
+          <a:p>
+            <a:pPr/>
+            <a:r>
               <a:t>Agenda</a:t>
             </a:r>
           </a:p>
@@ -3813,7 +4262,7 @@
       </p:sp>
       <p:sp>
         <p:nvSpPr>
-          <p:cNvPr id="193" name="The Research Question…"/>
+          <p:cNvPr id="200" name="The Research Question…"/>
           <p:cNvSpPr txBox="1"/>
           <p:nvPr>
             <p:ph type="body" sz="half" idx="1"/>
@@ -3885,7 +4334,7 @@
       </p:sp>
       <p:pic>
         <p:nvPicPr>
-          <p:cNvPr id="194" name="nycmap_black-c4ab43e9a3e2b0cf64475dc242f877e37f8e769f.png" descr="nycmap_black-c4ab43e9a3e2b0cf64475dc242f877e37f8e769f.png"/>
+          <p:cNvPr id="201" name="nycmap_black-c4ab43e9a3e2b0cf64475dc242f877e37f8e769f.png" descr="nycmap_black-c4ab43e9a3e2b0cf64475dc242f877e37f8e769f.png"/>
           <p:cNvPicPr>
             <a:picLocks noChangeAspect="1"/>
           </p:cNvPicPr>
@@ -3914,7 +4363,7 @@
       </p:pic>
       <p:sp>
         <p:nvSpPr>
-          <p:cNvPr id="195" name="QUEENS"/>
+          <p:cNvPr id="202" name="QUEENS"/>
           <p:cNvSpPr txBox="1"/>
           <p:nvPr/>
         </p:nvSpPr>
@@ -3958,7 +4407,7 @@
       </p:sp>
       <p:sp>
         <p:nvSpPr>
-          <p:cNvPr id="196" name="BROOKLYN"/>
+          <p:cNvPr id="203" name="BROOKLYN"/>
           <p:cNvSpPr txBox="1"/>
           <p:nvPr/>
         </p:nvSpPr>
@@ -4002,7 +4451,7 @@
       </p:sp>
       <p:sp>
         <p:nvSpPr>
-          <p:cNvPr id="197" name="STATEN…"/>
+          <p:cNvPr id="204" name="STATEN…"/>
           <p:cNvSpPr txBox="1"/>
           <p:nvPr/>
         </p:nvSpPr>
@@ -4056,7 +4505,7 @@
       </p:sp>
       <p:sp>
         <p:nvSpPr>
-          <p:cNvPr id="198" name="THE…"/>
+          <p:cNvPr id="205" name="THE…"/>
           <p:cNvSpPr txBox="1"/>
           <p:nvPr/>
         </p:nvSpPr>
@@ -4110,7 +4559,7 @@
       </p:sp>
       <p:sp>
         <p:nvSpPr>
-          <p:cNvPr id="199" name="MANHATTAN"/>
+          <p:cNvPr id="206" name="MANHATTAN"/>
           <p:cNvSpPr txBox="1"/>
           <p:nvPr/>
         </p:nvSpPr>
@@ -6505,131 +6954,45 @@
           <a:chExt cx="0" cy="0"/>
         </a:xfrm>
       </p:grpSpPr>
-      <p:sp>
-        <p:nvSpPr>
-          <p:cNvPr id="161" name="THE CHALLENGE(S)"/>
-          <p:cNvSpPr txBox="1"/>
-          <p:nvPr>
-            <p:ph type="title"/>
-          </p:nvPr>
-        </p:nvSpPr>
-        <p:spPr>
-          <a:prstGeom prst="rect">
-            <a:avLst/>
-          </a:prstGeom>
-        </p:spPr>
-        <p:txBody>
-          <a:bodyPr/>
-          <a:lstStyle/>
-          <a:p>
-            <a:pPr/>
-            <a:r>
-              <a:t>THE CHALLENGE(S)</a:t>
-            </a:r>
-          </a:p>
-        </p:txBody>
-      </p:sp>
-      <p:sp>
-        <p:nvSpPr>
-          <p:cNvPr id="162" name="Getting the components to talk to one another (mo modules mo problems!)…"/>
-          <p:cNvSpPr txBox="1"/>
-          <p:nvPr>
-            <p:ph type="body" sz="half" idx="1"/>
-          </p:nvPr>
-        </p:nvSpPr>
-        <p:spPr>
-          <a:prstGeom prst="rect">
-            <a:avLst/>
-          </a:prstGeom>
-        </p:spPr>
-        <p:txBody>
-          <a:bodyPr/>
-          <a:lstStyle/>
-          <a:p>
-            <a:pPr marL="371347" indent="-371347" defTabSz="502412">
-              <a:spcBef>
-                <a:spcPts val="3200"/>
-              </a:spcBef>
-              <a:defRPr sz="3268"/>
-            </a:pPr>
-            <a:r>
-              <a:t>Getting the components to talk to one another (mo modules mo problems!)</a:t>
-            </a:r>
-          </a:p>
-          <a:p>
-            <a:pPr marL="371347" indent="-371347" defTabSz="502412">
-              <a:spcBef>
-                <a:spcPts val="3200"/>
-              </a:spcBef>
-              <a:defRPr sz="3268"/>
-            </a:pPr>
-            <a:r>
-              <a:t>Importing data from Pandas into PostgreSQL (commas)</a:t>
-            </a:r>
-          </a:p>
-          <a:p>
-            <a:pPr marL="371347" indent="-371347" defTabSz="502412">
-              <a:spcBef>
-                <a:spcPts val="3200"/>
-              </a:spcBef>
-              <a:defRPr sz="3268"/>
-            </a:pPr>
-            <a:r>
-              <a:t>Converting Lat/Longs form addresses</a:t>
-            </a:r>
-          </a:p>
-          <a:p>
-            <a:pPr marL="371347" indent="-371347" defTabSz="502412">
-              <a:spcBef>
-                <a:spcPts val="3200"/>
-              </a:spcBef>
-              <a:defRPr sz="3268"/>
-            </a:pPr>
-            <a:r>
-              <a:t>JavaScript code running into each other (StoryMap prevents you from using many of the markers)</a:t>
-            </a:r>
-          </a:p>
-        </p:txBody>
-      </p:sp>
       <p:pic>
         <p:nvPicPr>
-          <p:cNvPr id="163" name="MVC_Diagram_(Model-View-Controller).svg.png" descr="MVC_Diagram_(Model-View-Controller).svg.png"/>
+          <p:cNvPr id="161" name="MVC_Diagram_(Model-View-Controller).svg.png" descr="MVC_Diagram_(Model-View-Controller).svg.png"/>
           <p:cNvPicPr>
             <a:picLocks noChangeAspect="1"/>
           </p:cNvPicPr>
-          <p:nvPr/>
+          <p:nvPr>
+            <p:ph type="pic" idx="13"/>
+          </p:nvPr>
         </p:nvPicPr>
         <p:blipFill>
           <a:blip r:embed="rId2">
             <a:extLst/>
           </a:blip>
+          <a:srcRect l="0" t="0" r="0" b="0"/>
           <a:stretch>
             <a:fillRect/>
           </a:stretch>
         </p:blipFill>
         <p:spPr>
           <a:xfrm>
-            <a:off x="6718300" y="2882900"/>
-            <a:ext cx="5588000" cy="5308600"/>
+            <a:off x="1368926" y="0"/>
+            <a:ext cx="10266948" cy="9753600"/>
           </a:xfrm>
           <a:prstGeom prst="rect">
             <a:avLst/>
           </a:prstGeom>
-          <a:ln w="12700">
-            <a:miter lim="400000"/>
-          </a:ln>
         </p:spPr>
       </p:pic>
       <p:sp>
         <p:nvSpPr>
-          <p:cNvPr id="164" name="PostgreSQL"/>
+          <p:cNvPr id="162" name="PostgreSQL"/>
           <p:cNvSpPr txBox="1"/>
           <p:nvPr/>
         </p:nvSpPr>
         <p:spPr>
           <a:xfrm>
-            <a:off x="7720558" y="4679949"/>
-            <a:ext cx="1297484" cy="393701"/>
+            <a:off x="3246784" y="3282950"/>
+            <a:ext cx="2244032" cy="622300"/>
           </a:xfrm>
           <a:prstGeom prst="rect">
             <a:avLst/>
@@ -6649,7 +7012,11 @@
           </a:bodyPr>
           <a:lstStyle>
             <a:lvl1pPr>
-              <a:defRPr sz="2000"/>
+              <a:defRPr>
+                <a:solidFill>
+                  <a:srgbClr val="0096FF"/>
+                </a:solidFill>
+              </a:defRPr>
             </a:lvl1pPr>
           </a:lstStyle>
           <a:p>
@@ -6662,14 +7029,14 @@
       </p:sp>
       <p:sp>
         <p:nvSpPr>
-          <p:cNvPr id="165" name="Leaflet.storyMap…"/>
+          <p:cNvPr id="163" name="Leaflet.StoryMap…"/>
           <p:cNvSpPr txBox="1"/>
           <p:nvPr/>
         </p:nvSpPr>
         <p:spPr>
           <a:xfrm>
-            <a:off x="8791674" y="6965950"/>
-            <a:ext cx="1847652" cy="977901"/>
+            <a:off x="5176390" y="7600950"/>
+            <a:ext cx="3287019" cy="1663701"/>
           </a:xfrm>
           <a:prstGeom prst="rect">
             <a:avLst/>
@@ -6690,15 +7057,23 @@
           <a:lstStyle/>
           <a:p>
             <a:pPr>
-              <a:defRPr sz="2000"/>
+              <a:defRPr>
+                <a:solidFill>
+                  <a:srgbClr val="0096FF"/>
+                </a:solidFill>
+              </a:defRPr>
             </a:pPr>
             <a:r>
-              <a:t>Leaflet.storyMap</a:t>
+              <a:t>Leaflet.StoryMap</a:t>
             </a:r>
           </a:p>
           <a:p>
             <a:pPr>
-              <a:defRPr sz="2000"/>
+              <a:defRPr>
+                <a:solidFill>
+                  <a:srgbClr val="0096FF"/>
+                </a:solidFill>
+              </a:defRPr>
             </a:pPr>
             <a:r>
               <a:t>HTML/CSS</a:t>
@@ -6706,7 +7081,11 @@
           </a:p>
           <a:p>
             <a:pPr>
-              <a:defRPr sz="2000"/>
+              <a:defRPr>
+                <a:solidFill>
+                  <a:srgbClr val="0096FF"/>
+                </a:solidFill>
+              </a:defRPr>
             </a:pPr>
             <a:r>
               <a:t>JavaScript</a:t>
@@ -6716,14 +7095,14 @@
       </p:sp>
       <p:sp>
         <p:nvSpPr>
-          <p:cNvPr id="166" name="Python…"/>
+          <p:cNvPr id="164" name="Python…"/>
           <p:cNvSpPr txBox="1"/>
           <p:nvPr/>
         </p:nvSpPr>
         <p:spPr>
           <a:xfrm>
-            <a:off x="10626625" y="4070350"/>
-            <a:ext cx="1428950" cy="977901"/>
+            <a:off x="8551366" y="2279650"/>
+            <a:ext cx="2480668" cy="1663701"/>
           </a:xfrm>
           <a:prstGeom prst="rect">
             <a:avLst/>
@@ -6744,7 +7123,11 @@
           <a:lstStyle/>
           <a:p>
             <a:pPr>
-              <a:defRPr sz="2000"/>
+              <a:defRPr>
+                <a:solidFill>
+                  <a:srgbClr val="0096FF"/>
+                </a:solidFill>
+              </a:defRPr>
             </a:pPr>
             <a:r>
               <a:t>Python</a:t>
@@ -6752,7 +7135,11 @@
           </a:p>
           <a:p>
             <a:pPr>
-              <a:defRPr sz="2000"/>
+              <a:defRPr>
+                <a:solidFill>
+                  <a:srgbClr val="0096FF"/>
+                </a:solidFill>
+              </a:defRPr>
             </a:pPr>
             <a:r>
               <a:t>Flask</a:t>
@@ -6760,7 +7147,11 @@
           </a:p>
           <a:p>
             <a:pPr>
-              <a:defRPr sz="2000"/>
+              <a:defRPr>
+                <a:solidFill>
+                  <a:srgbClr val="0096FF"/>
+                </a:solidFill>
+              </a:defRPr>
             </a:pPr>
             <a:r>
               <a:t>SQLAlchemy</a:t>
@@ -6796,7 +7187,7 @@
       </p:grpSpPr>
       <p:sp>
         <p:nvSpPr>
-          <p:cNvPr id="168" name="Agenda"/>
+          <p:cNvPr id="166" name="THE CHALLENGE(S)"/>
           <p:cNvSpPr txBox="1"/>
           <p:nvPr>
             <p:ph type="title"/>
@@ -6813,14 +7204,14 @@
           <a:p>
             <a:pPr/>
             <a:r>
-              <a:t>Agenda</a:t>
-            </a:r>
-          </a:p>
-        </p:txBody>
-      </p:sp>
-      <p:sp>
-        <p:nvSpPr>
-          <p:cNvPr id="169" name="The Research Question…"/>
+              <a:t>THE CHALLENGE(S)</a:t>
+            </a:r>
+          </a:p>
+        </p:txBody>
+      </p:sp>
+      <p:sp>
+        <p:nvSpPr>
+          <p:cNvPr id="167" name="Getting the components to talk to one another (mo modules mo problems!)…"/>
           <p:cNvSpPr txBox="1"/>
           <p:nvPr>
             <p:ph type="body" sz="half" idx="1"/>
@@ -6835,64 +7226,54 @@
           <a:bodyPr/>
           <a:lstStyle/>
           <a:p>
-            <a:pPr>
-              <a:defRPr>
-                <a:solidFill>
-                  <a:srgbClr val="D6D6D6"/>
-                </a:solidFill>
-              </a:defRPr>
+            <a:pPr marL="371347" indent="-371347" defTabSz="502412">
+              <a:spcBef>
+                <a:spcPts val="3200"/>
+              </a:spcBef>
+              <a:defRPr sz="3268"/>
             </a:pPr>
             <a:r>
-              <a:t>The Research Question</a:t>
-            </a:r>
-          </a:p>
-          <a:p>
-            <a:pPr>
-              <a:defRPr>
-                <a:solidFill>
-                  <a:srgbClr val="D6D6D6"/>
-                </a:solidFill>
-              </a:defRPr>
+              <a:t>Getting the components to talk to one another (mo modules mo problems!)</a:t>
+            </a:r>
+          </a:p>
+          <a:p>
+            <a:pPr marL="371347" indent="-371347" defTabSz="502412">
+              <a:spcBef>
+                <a:spcPts val="3200"/>
+              </a:spcBef>
+              <a:defRPr sz="3268"/>
             </a:pPr>
             <a:r>
-              <a:t>The Challenge</a:t>
-            </a:r>
-          </a:p>
-          <a:p>
-            <a:pPr/>
-            <a:r>
-              <a:t>The Choice (Demo)</a:t>
-            </a:r>
-          </a:p>
-          <a:p>
-            <a:pPr>
-              <a:defRPr>
-                <a:solidFill>
-                  <a:srgbClr val="D6D6D6"/>
-                </a:solidFill>
-              </a:defRPr>
+              <a:t>Importing data from Pandas into PostgreSQL (commas)</a:t>
+            </a:r>
+          </a:p>
+          <a:p>
+            <a:pPr marL="371347" indent="-371347" defTabSz="502412">
+              <a:spcBef>
+                <a:spcPts val="3200"/>
+              </a:spcBef>
+              <a:defRPr sz="3268"/>
             </a:pPr>
             <a:r>
-              <a:t>The Impacts</a:t>
-            </a:r>
-          </a:p>
-          <a:p>
-            <a:pPr>
-              <a:defRPr>
-                <a:solidFill>
-                  <a:srgbClr val="D6D6D6"/>
-                </a:solidFill>
-              </a:defRPr>
+              <a:t>Converting Lat/Longs form addresses</a:t>
+            </a:r>
+          </a:p>
+          <a:p>
+            <a:pPr marL="371347" indent="-371347" defTabSz="502412">
+              <a:spcBef>
+                <a:spcPts val="3200"/>
+              </a:spcBef>
+              <a:defRPr sz="3268"/>
             </a:pPr>
             <a:r>
-              <a:t>The End (Questions)</a:t>
+              <a:t>JavaScript code running into each other (StoryMap prevents you from using many of the markers)</a:t>
             </a:r>
           </a:p>
         </p:txBody>
       </p:sp>
       <p:pic>
         <p:nvPicPr>
-          <p:cNvPr id="170" name="nycmap_black-c4ab43e9a3e2b0cf64475dc242f877e37f8e769f.png" descr="nycmap_black-c4ab43e9a3e2b0cf64475dc242f877e37f8e769f.png"/>
+          <p:cNvPr id="168" name="nycmap_black-c4ab43e9a3e2b0cf64475dc242f877e37f8e769f.png" descr="nycmap_black-c4ab43e9a3e2b0cf64475dc242f877e37f8e769f.png"/>
           <p:cNvPicPr>
             <a:picLocks noChangeAspect="1"/>
           </p:cNvPicPr>
@@ -6921,7 +7302,7 @@
       </p:pic>
       <p:sp>
         <p:nvSpPr>
-          <p:cNvPr id="171" name="QUEENS"/>
+          <p:cNvPr id="169" name="QUEENS"/>
           <p:cNvSpPr txBox="1"/>
           <p:nvPr/>
         </p:nvSpPr>
@@ -6965,7 +7346,7 @@
       </p:sp>
       <p:sp>
         <p:nvSpPr>
-          <p:cNvPr id="172" name="BROOKLYN"/>
+          <p:cNvPr id="170" name="BROOKLYN"/>
           <p:cNvSpPr txBox="1"/>
           <p:nvPr/>
         </p:nvSpPr>
@@ -7009,7 +7390,7 @@
       </p:sp>
       <p:sp>
         <p:nvSpPr>
-          <p:cNvPr id="173" name="STATEN…"/>
+          <p:cNvPr id="171" name="STATEN…"/>
           <p:cNvSpPr txBox="1"/>
           <p:nvPr/>
         </p:nvSpPr>
@@ -7063,7 +7444,7 @@
       </p:sp>
       <p:sp>
         <p:nvSpPr>
-          <p:cNvPr id="174" name="THE…"/>
+          <p:cNvPr id="172" name="THE…"/>
           <p:cNvSpPr txBox="1"/>
           <p:nvPr/>
         </p:nvSpPr>
@@ -7117,7 +7498,7 @@
       </p:sp>
       <p:sp>
         <p:nvSpPr>
-          <p:cNvPr id="175" name="MANHATTAN"/>
+          <p:cNvPr id="173" name="MANHATTAN"/>
           <p:cNvSpPr txBox="1"/>
           <p:nvPr/>
         </p:nvSpPr>

</xml_diff>